<commit_message>
Fixed a bug where you can only add reply
</commit_message>
<xml_diff>
--- a/Maistor.bg Presentation.pptx
+++ b/Maistor.bg Presentation.pptx
@@ -111,6 +111,11 @@
       </a:defRPr>
     </a:lvl9pPr>
   </p:defaultTextStyle>
+  <p:extLst>
+    <p:ext uri="{EFAFB233-063F-42B5-8137-9DF3F51BA10A}">
+      <p15:sldGuideLst xmlns:p15="http://schemas.microsoft.com/office/powerpoint/2012/main"/>
+    </p:ext>
+  </p:extLst>
 </p:presentation>
 </file>
 
@@ -6668,7 +6673,7 @@
       </p:pic>
       <p:pic>
         <p:nvPicPr>
-          <p:cNvPr id="8" name="Picture 7"/>
+          <p:cNvPr id="9" name="Picture 8"/>
           <p:cNvPicPr>
             <a:picLocks noChangeAspect="1"/>
           </p:cNvPicPr>
@@ -6676,30 +6681,6 @@
         </p:nvPicPr>
         <p:blipFill>
           <a:blip r:embed="rId3"/>
-          <a:stretch>
-            <a:fillRect/>
-          </a:stretch>
-        </p:blipFill>
-        <p:spPr>
-          <a:xfrm>
-            <a:off x="2676783" y="790316"/>
-            <a:ext cx="3438525" cy="5915025"/>
-          </a:xfrm>
-          <a:prstGeom prst="rect">
-            <a:avLst/>
-          </a:prstGeom>
-        </p:spPr>
-      </p:pic>
-      <p:pic>
-        <p:nvPicPr>
-          <p:cNvPr id="9" name="Picture 8"/>
-          <p:cNvPicPr>
-            <a:picLocks noChangeAspect="1"/>
-          </p:cNvPicPr>
-          <p:nvPr/>
-        </p:nvPicPr>
-        <p:blipFill>
-          <a:blip r:embed="rId4"/>
           <a:stretch>
             <a:fillRect/>
           </a:stretch>
@@ -6723,7 +6704,7 @@
           <p:nvPr/>
         </p:nvPicPr>
         <p:blipFill>
-          <a:blip r:embed="rId5"/>
+          <a:blip r:embed="rId4"/>
           <a:stretch>
             <a:fillRect/>
           </a:stretch>
@@ -6747,7 +6728,7 @@
           <p:nvPr/>
         </p:nvPicPr>
         <p:blipFill>
-          <a:blip r:embed="rId6"/>
+          <a:blip r:embed="rId5"/>
           <a:stretch>
             <a:fillRect/>
           </a:stretch>
@@ -6756,6 +6737,30 @@
           <a:xfrm>
             <a:off x="5958145" y="2780783"/>
             <a:ext cx="1847850" cy="1581150"/>
+          </a:xfrm>
+          <a:prstGeom prst="rect">
+            <a:avLst/>
+          </a:prstGeom>
+        </p:spPr>
+      </p:pic>
+      <p:pic>
+        <p:nvPicPr>
+          <p:cNvPr id="3" name="Picture 2"/>
+          <p:cNvPicPr>
+            <a:picLocks noChangeAspect="1"/>
+          </p:cNvPicPr>
+          <p:nvPr/>
+        </p:nvPicPr>
+        <p:blipFill>
+          <a:blip r:embed="rId6"/>
+          <a:stretch>
+            <a:fillRect/>
+          </a:stretch>
+        </p:blipFill>
+        <p:spPr>
+          <a:xfrm>
+            <a:off x="2786320" y="785554"/>
+            <a:ext cx="3171825" cy="5924550"/>
           </a:xfrm>
           <a:prstGeom prst="rect">
             <a:avLst/>

</xml_diff>

<commit_message>
getCommentsForUser implemented, made a few changes in the presentation
</commit_message>
<xml_diff>
--- a/Maistor.bg Presentation.pptx
+++ b/Maistor.bg Presentation.pptx
@@ -842,7 +842,7 @@
             <a:fld id="{B61BEF0D-F0BB-DE4B-95CE-6DB70DBA9567}" type="datetimeFigureOut">
               <a:rPr lang="en-US" dirty="0"/>
               <a:pPr/>
-              <a:t>23-Feb-22</a:t>
+              <a:t>25-Feb-22</a:t>
             </a:fld>
             <a:endParaRPr lang="en-US" dirty="0"/>
           </a:p>
@@ -1090,7 +1090,7 @@
             <a:fld id="{B61BEF0D-F0BB-DE4B-95CE-6DB70DBA9567}" type="datetimeFigureOut">
               <a:rPr lang="en-US" dirty="0"/>
               <a:pPr/>
-              <a:t>23-Feb-22</a:t>
+              <a:t>25-Feb-22</a:t>
             </a:fld>
             <a:endParaRPr lang="en-US" dirty="0"/>
           </a:p>
@@ -1401,7 +1401,7 @@
             <a:fld id="{B61BEF0D-F0BB-DE4B-95CE-6DB70DBA9567}" type="datetimeFigureOut">
               <a:rPr lang="en-US" dirty="0"/>
               <a:pPr/>
-              <a:t>23-Feb-22</a:t>
+              <a:t>25-Feb-22</a:t>
             </a:fld>
             <a:endParaRPr lang="en-US" dirty="0"/>
           </a:p>
@@ -1739,7 +1739,7 @@
             <a:fld id="{B61BEF0D-F0BB-DE4B-95CE-6DB70DBA9567}" type="datetimeFigureOut">
               <a:rPr lang="en-US" dirty="0"/>
               <a:pPr/>
-              <a:t>23-Feb-22</a:t>
+              <a:t>25-Feb-22</a:t>
             </a:fld>
             <a:endParaRPr lang="en-US" dirty="0"/>
           </a:p>
@@ -2050,7 +2050,7 @@
             <a:fld id="{B61BEF0D-F0BB-DE4B-95CE-6DB70DBA9567}" type="datetimeFigureOut">
               <a:rPr lang="en-US" dirty="0"/>
               <a:pPr/>
-              <a:t>23-Feb-22</a:t>
+              <a:t>25-Feb-22</a:t>
             </a:fld>
             <a:endParaRPr lang="en-US" dirty="0"/>
           </a:p>
@@ -2440,7 +2440,7 @@
             <a:fld id="{B61BEF0D-F0BB-DE4B-95CE-6DB70DBA9567}" type="datetimeFigureOut">
               <a:rPr lang="en-US" dirty="0"/>
               <a:pPr/>
-              <a:t>23-Feb-22</a:t>
+              <a:t>25-Feb-22</a:t>
             </a:fld>
             <a:endParaRPr lang="en-US" dirty="0"/>
           </a:p>
@@ -2606,7 +2606,7 @@
           <a:p>
             <a:fld id="{55C6B4A9-1611-4792-9094-5F34BCA07E0B}" type="datetimeFigureOut">
               <a:rPr lang="en-US" dirty="0"/>
-              <a:t>23-Feb-22</a:t>
+              <a:t>25-Feb-22</a:t>
             </a:fld>
             <a:endParaRPr lang="en-US" dirty="0"/>
           </a:p>
@@ -2782,7 +2782,7 @@
             <a:fld id="{B61BEF0D-F0BB-DE4B-95CE-6DB70DBA9567}" type="datetimeFigureOut">
               <a:rPr lang="en-US" dirty="0"/>
               <a:pPr/>
-              <a:t>23-Feb-22</a:t>
+              <a:t>25-Feb-22</a:t>
             </a:fld>
             <a:endParaRPr lang="en-US" dirty="0"/>
           </a:p>
@@ -2955,7 +2955,7 @@
             <a:fld id="{B61BEF0D-F0BB-DE4B-95CE-6DB70DBA9567}" type="datetimeFigureOut">
               <a:rPr lang="en-US" dirty="0"/>
               <a:pPr/>
-              <a:t>23-Feb-22</a:t>
+              <a:t>25-Feb-22</a:t>
             </a:fld>
             <a:endParaRPr lang="en-US" dirty="0"/>
           </a:p>
@@ -3199,7 +3199,7 @@
             <a:fld id="{B61BEF0D-F0BB-DE4B-95CE-6DB70DBA9567}" type="datetimeFigureOut">
               <a:rPr lang="en-US" dirty="0"/>
               <a:pPr/>
-              <a:t>23-Feb-22</a:t>
+              <a:t>25-Feb-22</a:t>
             </a:fld>
             <a:endParaRPr lang="en-US" dirty="0"/>
           </a:p>
@@ -3427,7 +3427,7 @@
           <a:p>
             <a:fld id="{EB712588-04B1-427B-82EE-E8DB90309F08}" type="datetimeFigureOut">
               <a:rPr lang="en-US" dirty="0"/>
-              <a:t>23-Feb-22</a:t>
+              <a:t>25-Feb-22</a:t>
             </a:fld>
             <a:endParaRPr lang="en-US" dirty="0"/>
           </a:p>
@@ -3797,7 +3797,7 @@
             <a:fld id="{B61BEF0D-F0BB-DE4B-95CE-6DB70DBA9567}" type="datetimeFigureOut">
               <a:rPr lang="en-US" dirty="0"/>
               <a:pPr/>
-              <a:t>23-Feb-22</a:t>
+              <a:t>25-Feb-22</a:t>
             </a:fld>
             <a:endParaRPr lang="en-US" dirty="0"/>
           </a:p>
@@ -3917,7 +3917,7 @@
             <a:fld id="{B61BEF0D-F0BB-DE4B-95CE-6DB70DBA9567}" type="datetimeFigureOut">
               <a:rPr lang="en-US" dirty="0"/>
               <a:pPr/>
-              <a:t>23-Feb-22</a:t>
+              <a:t>25-Feb-22</a:t>
             </a:fld>
             <a:endParaRPr lang="en-US" dirty="0"/>
           </a:p>
@@ -4009,7 +4009,7 @@
             <a:fld id="{B61BEF0D-F0BB-DE4B-95CE-6DB70DBA9567}" type="datetimeFigureOut">
               <a:rPr lang="en-US" dirty="0"/>
               <a:pPr/>
-              <a:t>23-Feb-22</a:t>
+              <a:t>25-Feb-22</a:t>
             </a:fld>
             <a:endParaRPr lang="en-US" dirty="0"/>
           </a:p>
@@ -4260,7 +4260,7 @@
           <a:p>
             <a:fld id="{42A54C80-263E-416B-A8E0-580EDEADCBDC}" type="datetimeFigureOut">
               <a:rPr lang="en-US" dirty="0"/>
-              <a:t>23-Feb-22</a:t>
+              <a:t>25-Feb-22</a:t>
             </a:fld>
             <a:endParaRPr lang="en-US" dirty="0"/>
           </a:p>
@@ -4519,7 +4519,7 @@
             <a:fld id="{B61BEF0D-F0BB-DE4B-95CE-6DB70DBA9567}" type="datetimeFigureOut">
               <a:rPr lang="en-US" dirty="0"/>
               <a:pPr/>
-              <a:t>23-Feb-22</a:t>
+              <a:t>25-Feb-22</a:t>
             </a:fld>
             <a:endParaRPr lang="en-US" dirty="0"/>
           </a:p>
@@ -5259,7 +5259,7 @@
             <a:fld id="{B61BEF0D-F0BB-DE4B-95CE-6DB70DBA9567}" type="datetimeFigureOut">
               <a:rPr lang="en-US" dirty="0"/>
               <a:pPr/>
-              <a:t>23-Feb-22</a:t>
+              <a:t>25-Feb-22</a:t>
             </a:fld>
             <a:endParaRPr lang="en-US" dirty="0"/>
           </a:p>
@@ -5837,18 +5837,11 @@
           <a:lstStyle/>
           <a:p>
             <a:r>
-              <a:rPr lang="en-US" sz="2000" dirty="0" err="1" smtClean="0">
-                <a:latin typeface="Times New Roman" panose="02020603050405020304" pitchFamily="18" charset="0"/>
-                <a:cs typeface="Times New Roman" panose="02020603050405020304" pitchFamily="18" charset="0"/>
-              </a:rPr>
-              <a:t>Tsvetelin</a:t>
-            </a:r>
-            <a:r>
               <a:rPr lang="en-US" sz="2000" dirty="0" smtClean="0">
                 <a:latin typeface="Times New Roman" panose="02020603050405020304" pitchFamily="18" charset="0"/>
                 <a:cs typeface="Times New Roman" panose="02020603050405020304" pitchFamily="18" charset="0"/>
               </a:rPr>
-              <a:t> Takiev &amp; Martin Ivanov</a:t>
+              <a:t>Tsvetelin Takiev &amp; Martin Ivanov</a:t>
             </a:r>
             <a:endParaRPr lang="en-US" sz="2000" dirty="0">
               <a:latin typeface="Times New Roman" panose="02020603050405020304" pitchFamily="18" charset="0"/>
@@ -5867,6 +5860,13 @@
   <p:clrMapOvr>
     <a:masterClrMapping/>
   </p:clrMapOvr>
+  <p:timing>
+    <p:tnLst>
+      <p:par>
+        <p:cTn id="1" dur="indefinite" restart="never" nodeType="tmRoot"/>
+      </p:par>
+    </p:tnLst>
+  </p:timing>
 </p:sld>
 </file>
 
@@ -5986,10 +5986,13 @@
             </a:r>
           </a:p>
           <a:p>
-            <a:endParaRPr lang="en-US" dirty="0" smtClean="0">
-              <a:latin typeface="Times New Roman" panose="02020603050405020304" pitchFamily="18" charset="0"/>
-              <a:cs typeface="Times New Roman" panose="02020603050405020304" pitchFamily="18" charset="0"/>
-            </a:endParaRPr>
+            <a:r>
+              <a:rPr lang="en-US" dirty="0" smtClean="0">
+                <a:latin typeface="Times New Roman" panose="02020603050405020304" pitchFamily="18" charset="0"/>
+                <a:cs typeface="Times New Roman" panose="02020603050405020304" pitchFamily="18" charset="0"/>
+              </a:rPr>
+              <a:t>Add category and delete category(admin)</a:t>
+            </a:r>
           </a:p>
           <a:p>
             <a:endParaRPr lang="en-US" dirty="0" smtClean="0"/>
@@ -6009,6 +6012,13 @@
   <p:clrMapOvr>
     <a:masterClrMapping/>
   </p:clrMapOvr>
+  <p:timing>
+    <p:tnLst>
+      <p:par>
+        <p:cTn id="1" dur="indefinite" restart="never" nodeType="tmRoot"/>
+      </p:par>
+    </p:tnLst>
+  </p:timing>
 </p:sld>
 </file>
 
@@ -6070,13 +6080,13 @@
         </p:nvSpPr>
         <p:spPr>
           <a:xfrm>
-            <a:off x="677334" y="2160589"/>
+            <a:off x="677334" y="1872265"/>
             <a:ext cx="3367444" cy="4363779"/>
           </a:xfrm>
         </p:spPr>
         <p:txBody>
           <a:bodyPr>
-            <a:normAutofit/>
+            <a:normAutofit fontScale="92500" lnSpcReduction="10000"/>
           </a:bodyPr>
           <a:lstStyle/>
           <a:p>
@@ -6124,6 +6134,15 @@
                 <a:latin typeface="Times New Roman" panose="02020603050405020304" pitchFamily="18" charset="0"/>
                 <a:cs typeface="Times New Roman" panose="02020603050405020304" pitchFamily="18" charset="0"/>
               </a:rPr>
+              <a:t>Spring Data JPA</a:t>
+            </a:r>
+          </a:p>
+          <a:p>
+            <a:r>
+              <a:rPr lang="en-US" dirty="0" smtClean="0">
+                <a:latin typeface="Times New Roman" panose="02020603050405020304" pitchFamily="18" charset="0"/>
+                <a:cs typeface="Times New Roman" panose="02020603050405020304" pitchFamily="18" charset="0"/>
+              </a:rPr>
               <a:t>Maven</a:t>
             </a:r>
           </a:p>
@@ -6171,6 +6190,15 @@
               </a:rPr>
               <a:t>Lombok</a:t>
             </a:r>
+          </a:p>
+          <a:p>
+            <a:r>
+              <a:rPr lang="en-US" dirty="0" smtClean="0">
+                <a:latin typeface="Times New Roman" panose="02020603050405020304" pitchFamily="18" charset="0"/>
+                <a:cs typeface="Times New Roman" panose="02020603050405020304" pitchFamily="18" charset="0"/>
+              </a:rPr>
+              <a:t>Model Mapper</a:t>
+            </a:r>
             <a:endParaRPr lang="en-US" dirty="0">
               <a:latin typeface="Times New Roman" panose="02020603050405020304" pitchFamily="18" charset="0"/>
               <a:cs typeface="Times New Roman" panose="02020603050405020304" pitchFamily="18" charset="0"/>
@@ -6188,7 +6216,7 @@
         </p:nvSpPr>
         <p:spPr>
           <a:xfrm>
-            <a:off x="5261691" y="2160588"/>
+            <a:off x="5286405" y="1872265"/>
             <a:ext cx="3367444" cy="4363779"/>
           </a:xfrm>
           <a:prstGeom prst="rect">
@@ -6500,6 +6528,13 @@
   <p:clrMapOvr>
     <a:masterClrMapping/>
   </p:clrMapOvr>
+  <p:timing>
+    <p:tnLst>
+      <p:par>
+        <p:cTn id="1" dur="indefinite" restart="never" nodeType="tmRoot"/>
+      </p:par>
+    </p:tnLst>
+  </p:timing>
 </p:sld>
 </file>
 
@@ -6578,8 +6613,8 @@
         </p:blipFill>
         <p:spPr>
           <a:xfrm>
-            <a:off x="1294912" y="799070"/>
-            <a:ext cx="7301756" cy="5829491"/>
+            <a:off x="1912343" y="0"/>
+            <a:ext cx="8599138" cy="6865280"/>
           </a:xfrm>
         </p:spPr>
       </p:pic>
@@ -6593,6 +6628,13 @@
   <p:clrMapOvr>
     <a:masterClrMapping/>
   </p:clrMapOvr>
+  <p:timing>
+    <p:tnLst>
+      <p:par>
+        <p:cTn id="1" dur="indefinite" restart="never" nodeType="tmRoot"/>
+      </p:par>
+    </p:tnLst>
+  </p:timing>
 </p:sld>
 </file>
 
@@ -6711,7 +6753,7 @@
         </p:blipFill>
         <p:spPr>
           <a:xfrm>
-            <a:off x="6062920" y="4490262"/>
+            <a:off x="6071157" y="2824826"/>
             <a:ext cx="1743075" cy="1190625"/>
           </a:xfrm>
           <a:prstGeom prst="rect">
@@ -6735,7 +6777,7 @@
         </p:blipFill>
         <p:spPr>
           <a:xfrm>
-            <a:off x="5958145" y="2780783"/>
+            <a:off x="5958145" y="4187823"/>
             <a:ext cx="1847850" cy="1581150"/>
           </a:xfrm>
           <a:prstGeom prst="rect">
@@ -6777,6 +6819,13 @@
   <p:clrMapOvr>
     <a:masterClrMapping/>
   </p:clrMapOvr>
+  <p:timing>
+    <p:tnLst>
+      <p:par>
+        <p:cTn id="1" dur="indefinite" restart="never" nodeType="tmRoot"/>
+      </p:par>
+    </p:tnLst>
+  </p:timing>
 </p:sld>
 </file>
 
@@ -6877,6 +6926,13 @@
   <p:clrMapOvr>
     <a:masterClrMapping/>
   </p:clrMapOvr>
+  <p:timing>
+    <p:tnLst>
+      <p:par>
+        <p:cTn id="1" dur="indefinite" restart="never" nodeType="tmRoot"/>
+      </p:par>
+    </p:tnLst>
+  </p:timing>
 </p:sld>
 </file>
 
@@ -6980,6 +7036,13 @@
   <p:clrMapOvr>
     <a:masterClrMapping/>
   </p:clrMapOvr>
+  <p:timing>
+    <p:tnLst>
+      <p:par>
+        <p:cTn id="1" dur="indefinite" restart="never" nodeType="tmRoot"/>
+      </p:par>
+    </p:tnLst>
+  </p:timing>
 </p:sld>
 </file>
 

</xml_diff>

<commit_message>
Edited presentation and EER Diagram
</commit_message>
<xml_diff>
--- a/Maistor.bg Presentation.pptx
+++ b/Maistor.bg Presentation.pptx
@@ -6,13 +6,14 @@
   </p:sldMasterIdLst>
   <p:sldIdLst>
     <p:sldId id="256" r:id="rId2"/>
-    <p:sldId id="259" r:id="rId3"/>
-    <p:sldId id="260" r:id="rId4"/>
-    <p:sldId id="261" r:id="rId5"/>
-    <p:sldId id="262" r:id="rId6"/>
-    <p:sldId id="263" r:id="rId7"/>
-    <p:sldId id="257" r:id="rId8"/>
-    <p:sldId id="258" r:id="rId9"/>
+    <p:sldId id="264" r:id="rId3"/>
+    <p:sldId id="259" r:id="rId4"/>
+    <p:sldId id="260" r:id="rId5"/>
+    <p:sldId id="261" r:id="rId6"/>
+    <p:sldId id="262" r:id="rId7"/>
+    <p:sldId id="263" r:id="rId8"/>
+    <p:sldId id="257" r:id="rId9"/>
+    <p:sldId id="258" r:id="rId10"/>
   </p:sldIdLst>
   <p:sldSz cx="12192000" cy="6858000"/>
   <p:notesSz cx="6858000" cy="9144000"/>
@@ -842,7 +843,7 @@
             <a:fld id="{B61BEF0D-F0BB-DE4B-95CE-6DB70DBA9567}" type="datetimeFigureOut">
               <a:rPr lang="en-US" dirty="0"/>
               <a:pPr/>
-              <a:t>25-Feb-22</a:t>
+              <a:t>27-Feb-22</a:t>
             </a:fld>
             <a:endParaRPr lang="en-US" dirty="0"/>
           </a:p>
@@ -1090,7 +1091,7 @@
             <a:fld id="{B61BEF0D-F0BB-DE4B-95CE-6DB70DBA9567}" type="datetimeFigureOut">
               <a:rPr lang="en-US" dirty="0"/>
               <a:pPr/>
-              <a:t>25-Feb-22</a:t>
+              <a:t>27-Feb-22</a:t>
             </a:fld>
             <a:endParaRPr lang="en-US" dirty="0"/>
           </a:p>
@@ -1401,7 +1402,7 @@
             <a:fld id="{B61BEF0D-F0BB-DE4B-95CE-6DB70DBA9567}" type="datetimeFigureOut">
               <a:rPr lang="en-US" dirty="0"/>
               <a:pPr/>
-              <a:t>25-Feb-22</a:t>
+              <a:t>27-Feb-22</a:t>
             </a:fld>
             <a:endParaRPr lang="en-US" dirty="0"/>
           </a:p>
@@ -1739,7 +1740,7 @@
             <a:fld id="{B61BEF0D-F0BB-DE4B-95CE-6DB70DBA9567}" type="datetimeFigureOut">
               <a:rPr lang="en-US" dirty="0"/>
               <a:pPr/>
-              <a:t>25-Feb-22</a:t>
+              <a:t>27-Feb-22</a:t>
             </a:fld>
             <a:endParaRPr lang="en-US" dirty="0"/>
           </a:p>
@@ -2050,7 +2051,7 @@
             <a:fld id="{B61BEF0D-F0BB-DE4B-95CE-6DB70DBA9567}" type="datetimeFigureOut">
               <a:rPr lang="en-US" dirty="0"/>
               <a:pPr/>
-              <a:t>25-Feb-22</a:t>
+              <a:t>27-Feb-22</a:t>
             </a:fld>
             <a:endParaRPr lang="en-US" dirty="0"/>
           </a:p>
@@ -2440,7 +2441,7 @@
             <a:fld id="{B61BEF0D-F0BB-DE4B-95CE-6DB70DBA9567}" type="datetimeFigureOut">
               <a:rPr lang="en-US" dirty="0"/>
               <a:pPr/>
-              <a:t>25-Feb-22</a:t>
+              <a:t>27-Feb-22</a:t>
             </a:fld>
             <a:endParaRPr lang="en-US" dirty="0"/>
           </a:p>
@@ -2606,7 +2607,7 @@
           <a:p>
             <a:fld id="{55C6B4A9-1611-4792-9094-5F34BCA07E0B}" type="datetimeFigureOut">
               <a:rPr lang="en-US" dirty="0"/>
-              <a:t>25-Feb-22</a:t>
+              <a:t>27-Feb-22</a:t>
             </a:fld>
             <a:endParaRPr lang="en-US" dirty="0"/>
           </a:p>
@@ -2782,7 +2783,7 @@
             <a:fld id="{B61BEF0D-F0BB-DE4B-95CE-6DB70DBA9567}" type="datetimeFigureOut">
               <a:rPr lang="en-US" dirty="0"/>
               <a:pPr/>
-              <a:t>25-Feb-22</a:t>
+              <a:t>27-Feb-22</a:t>
             </a:fld>
             <a:endParaRPr lang="en-US" dirty="0"/>
           </a:p>
@@ -2955,7 +2956,7 @@
             <a:fld id="{B61BEF0D-F0BB-DE4B-95CE-6DB70DBA9567}" type="datetimeFigureOut">
               <a:rPr lang="en-US" dirty="0"/>
               <a:pPr/>
-              <a:t>25-Feb-22</a:t>
+              <a:t>27-Feb-22</a:t>
             </a:fld>
             <a:endParaRPr lang="en-US" dirty="0"/>
           </a:p>
@@ -3199,7 +3200,7 @@
             <a:fld id="{B61BEF0D-F0BB-DE4B-95CE-6DB70DBA9567}" type="datetimeFigureOut">
               <a:rPr lang="en-US" dirty="0"/>
               <a:pPr/>
-              <a:t>25-Feb-22</a:t>
+              <a:t>27-Feb-22</a:t>
             </a:fld>
             <a:endParaRPr lang="en-US" dirty="0"/>
           </a:p>
@@ -3427,7 +3428,7 @@
           <a:p>
             <a:fld id="{EB712588-04B1-427B-82EE-E8DB90309F08}" type="datetimeFigureOut">
               <a:rPr lang="en-US" dirty="0"/>
-              <a:t>25-Feb-22</a:t>
+              <a:t>27-Feb-22</a:t>
             </a:fld>
             <a:endParaRPr lang="en-US" dirty="0"/>
           </a:p>
@@ -3797,7 +3798,7 @@
             <a:fld id="{B61BEF0D-F0BB-DE4B-95CE-6DB70DBA9567}" type="datetimeFigureOut">
               <a:rPr lang="en-US" dirty="0"/>
               <a:pPr/>
-              <a:t>25-Feb-22</a:t>
+              <a:t>27-Feb-22</a:t>
             </a:fld>
             <a:endParaRPr lang="en-US" dirty="0"/>
           </a:p>
@@ -3917,7 +3918,7 @@
             <a:fld id="{B61BEF0D-F0BB-DE4B-95CE-6DB70DBA9567}" type="datetimeFigureOut">
               <a:rPr lang="en-US" dirty="0"/>
               <a:pPr/>
-              <a:t>25-Feb-22</a:t>
+              <a:t>27-Feb-22</a:t>
             </a:fld>
             <a:endParaRPr lang="en-US" dirty="0"/>
           </a:p>
@@ -4009,7 +4010,7 @@
             <a:fld id="{B61BEF0D-F0BB-DE4B-95CE-6DB70DBA9567}" type="datetimeFigureOut">
               <a:rPr lang="en-US" dirty="0"/>
               <a:pPr/>
-              <a:t>25-Feb-22</a:t>
+              <a:t>27-Feb-22</a:t>
             </a:fld>
             <a:endParaRPr lang="en-US" dirty="0"/>
           </a:p>
@@ -4260,7 +4261,7 @@
           <a:p>
             <a:fld id="{42A54C80-263E-416B-A8E0-580EDEADCBDC}" type="datetimeFigureOut">
               <a:rPr lang="en-US" dirty="0"/>
-              <a:t>25-Feb-22</a:t>
+              <a:t>27-Feb-22</a:t>
             </a:fld>
             <a:endParaRPr lang="en-US" dirty="0"/>
           </a:p>
@@ -4519,7 +4520,7 @@
             <a:fld id="{B61BEF0D-F0BB-DE4B-95CE-6DB70DBA9567}" type="datetimeFigureOut">
               <a:rPr lang="en-US" dirty="0"/>
               <a:pPr/>
-              <a:t>25-Feb-22</a:t>
+              <a:t>27-Feb-22</a:t>
             </a:fld>
             <a:endParaRPr lang="en-US" dirty="0"/>
           </a:p>
@@ -5259,7 +5260,7 @@
             <a:fld id="{B61BEF0D-F0BB-DE4B-95CE-6DB70DBA9567}" type="datetimeFigureOut">
               <a:rPr lang="en-US" dirty="0"/>
               <a:pPr/>
-              <a:t>25-Feb-22</a:t>
+              <a:t>27-Feb-22</a:t>
             </a:fld>
             <a:endParaRPr lang="en-US" dirty="0"/>
           </a:p>
@@ -5814,42 +5815,6 @@
           </a:p>
         </p:txBody>
       </p:sp>
-      <p:sp>
-        <p:nvSpPr>
-          <p:cNvPr id="3" name="Subtitle 2"/>
-          <p:cNvSpPr>
-            <a:spLocks noGrp="1"/>
-          </p:cNvSpPr>
-          <p:nvPr>
-            <p:ph type="subTitle" idx="1"/>
-          </p:nvPr>
-        </p:nvSpPr>
-        <p:spPr>
-          <a:xfrm>
-            <a:off x="6087763" y="4965234"/>
-            <a:ext cx="3655798" cy="471740"/>
-          </a:xfrm>
-        </p:spPr>
-        <p:txBody>
-          <a:bodyPr>
-            <a:normAutofit/>
-          </a:bodyPr>
-          <a:lstStyle/>
-          <a:p>
-            <a:r>
-              <a:rPr lang="en-US" sz="2000" dirty="0" smtClean="0">
-                <a:latin typeface="Times New Roman" panose="02020603050405020304" pitchFamily="18" charset="0"/>
-                <a:cs typeface="Times New Roman" panose="02020603050405020304" pitchFamily="18" charset="0"/>
-              </a:rPr>
-              <a:t>Tsvetelin Takiev &amp; Martin Ivanov</a:t>
-            </a:r>
-            <a:endParaRPr lang="en-US" sz="2000" dirty="0">
-              <a:latin typeface="Times New Roman" panose="02020603050405020304" pitchFamily="18" charset="0"/>
-              <a:cs typeface="Times New Roman" panose="02020603050405020304" pitchFamily="18" charset="0"/>
-            </a:endParaRPr>
-          </a:p>
-        </p:txBody>
-      </p:sp>
     </p:spTree>
     <p:extLst>
       <p:ext uri="{BB962C8B-B14F-4D97-AF65-F5344CB8AC3E}">
@@ -5908,7 +5873,7 @@
                 <a:latin typeface="Times New Roman" panose="02020603050405020304" pitchFamily="18" charset="0"/>
                 <a:cs typeface="Times New Roman" panose="02020603050405020304" pitchFamily="18" charset="0"/>
               </a:rPr>
-              <a:t>Main functionality</a:t>
+              <a:t>Who are we?</a:t>
             </a:r>
             <a:endParaRPr lang="en-US" dirty="0">
               <a:latin typeface="Times New Roman" panose="02020603050405020304" pitchFamily="18" charset="0"/>
@@ -5917,108 +5882,238 @@
           </a:p>
         </p:txBody>
       </p:sp>
-      <p:sp>
-        <p:nvSpPr>
-          <p:cNvPr id="3" name="Content Placeholder 2"/>
-          <p:cNvSpPr>
-            <a:spLocks noGrp="1"/>
-          </p:cNvSpPr>
-          <p:nvPr>
-            <p:ph idx="1"/>
-          </p:nvPr>
-        </p:nvSpPr>
-        <p:spPr/>
-        <p:txBody>
-          <a:bodyPr/>
-          <a:lstStyle/>
-          <a:p>
-            <a:r>
-              <a:rPr lang="en-US" dirty="0" smtClean="0">
+      <p:pic>
+        <p:nvPicPr>
+          <p:cNvPr id="4" name="Picture 3"/>
+          <p:cNvPicPr>
+            <a:picLocks noChangeAspect="1"/>
+          </p:cNvPicPr>
+          <p:nvPr/>
+        </p:nvPicPr>
+        <p:blipFill>
+          <a:blip r:embed="rId2">
+            <a:extLst>
+              <a:ext uri="{28A0092B-C50C-407E-A947-70E740481C1C}">
+                <a14:useLocalDpi xmlns:a14="http://schemas.microsoft.com/office/drawing/2010/main" val="0"/>
+              </a:ext>
+            </a:extLst>
+          </a:blip>
+          <a:stretch>
+            <a:fillRect/>
+          </a:stretch>
+        </p:blipFill>
+        <p:spPr>
+          <a:xfrm>
+            <a:off x="5535827" y="2176162"/>
+            <a:ext cx="3738175" cy="2803631"/>
+          </a:xfrm>
+          <a:prstGeom prst="round2DiagRect">
+            <a:avLst>
+              <a:gd name="adj1" fmla="val 16667"/>
+              <a:gd name="adj2" fmla="val 0"/>
+            </a:avLst>
+          </a:prstGeom>
+          <a:ln w="88900" cap="sq">
+            <a:solidFill>
+              <a:srgbClr val="FFFFFF"/>
+            </a:solidFill>
+            <a:miter lim="800000"/>
+          </a:ln>
+          <a:effectLst>
+            <a:outerShdw blurRad="254000" algn="tl" rotWithShape="0">
+              <a:srgbClr val="000000">
+                <a:alpha val="43000"/>
+              </a:srgbClr>
+            </a:outerShdw>
+          </a:effectLst>
+        </p:spPr>
+      </p:pic>
+      <p:sp>
+        <p:nvSpPr>
+          <p:cNvPr id="6" name="TextBox 5"/>
+          <p:cNvSpPr txBox="1"/>
+          <p:nvPr/>
+        </p:nvSpPr>
+        <p:spPr>
+          <a:xfrm>
+            <a:off x="6681313" y="5225555"/>
+            <a:ext cx="1826142" cy="707886"/>
+          </a:xfrm>
+          <a:prstGeom prst="rect">
+            <a:avLst/>
+          </a:prstGeom>
+          <a:noFill/>
+        </p:spPr>
+        <p:txBody>
+          <a:bodyPr wrap="none" rtlCol="0">
+            <a:spAutoFit/>
+          </a:bodyPr>
+          <a:lstStyle/>
+          <a:p>
+            <a:pPr algn="ctr"/>
+            <a:r>
+              <a:rPr lang="en-US" sz="2000" dirty="0" smtClean="0">
+                <a:ln w="0"/>
+                <a:effectLst>
+                  <a:outerShdw blurRad="38100" dist="19050" dir="2700000" algn="tl" rotWithShape="0">
+                    <a:schemeClr val="dk1">
+                      <a:alpha val="40000"/>
+                    </a:schemeClr>
+                  </a:outerShdw>
+                </a:effectLst>
                 <a:latin typeface="Times New Roman" panose="02020603050405020304" pitchFamily="18" charset="0"/>
                 <a:cs typeface="Times New Roman" panose="02020603050405020304" pitchFamily="18" charset="0"/>
               </a:rPr>
-              <a:t>Registration and login</a:t>
-            </a:r>
-          </a:p>
-          <a:p>
-            <a:r>
-              <a:rPr lang="en-US" dirty="0" smtClean="0">
+              <a:t>Martin Ivanov</a:t>
+            </a:r>
+          </a:p>
+          <a:p>
+            <a:pPr algn="ctr"/>
+            <a:r>
+              <a:rPr lang="en-US" sz="2000" dirty="0">
+                <a:ln w="0"/>
+                <a:effectLst>
+                  <a:outerShdw blurRad="38100" dist="19050" dir="2700000" algn="tl" rotWithShape="0">
+                    <a:schemeClr val="dk1">
+                      <a:alpha val="40000"/>
+                    </a:schemeClr>
+                  </a:outerShdw>
+                </a:effectLst>
                 <a:latin typeface="Times New Roman" panose="02020603050405020304" pitchFamily="18" charset="0"/>
                 <a:cs typeface="Times New Roman" panose="02020603050405020304" pitchFamily="18" charset="0"/>
               </a:rPr>
-              <a:t>Upload a profile picture</a:t>
-            </a:r>
-          </a:p>
-          <a:p>
-            <a:r>
-              <a:rPr lang="en-US" dirty="0" smtClean="0">
+              <a:t>Moto enthusiast</a:t>
+            </a:r>
+          </a:p>
+        </p:txBody>
+      </p:sp>
+      <p:pic>
+        <p:nvPicPr>
+          <p:cNvPr id="8" name="Picture 7"/>
+          <p:cNvPicPr>
+            <a:picLocks noChangeAspect="1"/>
+          </p:cNvPicPr>
+          <p:nvPr/>
+        </p:nvPicPr>
+        <p:blipFill>
+          <a:blip r:embed="rId3">
+            <a:extLst>
+              <a:ext uri="{28A0092B-C50C-407E-A947-70E740481C1C}">
+                <a14:useLocalDpi xmlns:a14="http://schemas.microsoft.com/office/drawing/2010/main" val="0"/>
+              </a:ext>
+            </a:extLst>
+          </a:blip>
+          <a:stretch>
+            <a:fillRect/>
+          </a:stretch>
+        </p:blipFill>
+        <p:spPr>
+          <a:xfrm>
+            <a:off x="1062681" y="1393567"/>
+            <a:ext cx="2759088" cy="3677182"/>
+          </a:xfrm>
+          <a:prstGeom prst="round2DiagRect">
+            <a:avLst>
+              <a:gd name="adj1" fmla="val 16667"/>
+              <a:gd name="adj2" fmla="val 0"/>
+            </a:avLst>
+          </a:prstGeom>
+          <a:ln w="88900" cap="sq">
+            <a:solidFill>
+              <a:srgbClr val="FFFFFF"/>
+            </a:solidFill>
+            <a:miter lim="800000"/>
+          </a:ln>
+          <a:effectLst>
+            <a:outerShdw blurRad="254000" algn="tl" rotWithShape="0">
+              <a:srgbClr val="000000">
+                <a:alpha val="43000"/>
+              </a:srgbClr>
+            </a:outerShdw>
+          </a:effectLst>
+        </p:spPr>
+      </p:pic>
+      <p:sp>
+        <p:nvSpPr>
+          <p:cNvPr id="9" name="TextBox 8"/>
+          <p:cNvSpPr txBox="1"/>
+          <p:nvPr/>
+        </p:nvSpPr>
+        <p:spPr>
+          <a:xfrm>
+            <a:off x="450333" y="5225555"/>
+            <a:ext cx="3983783" cy="707886"/>
+          </a:xfrm>
+          <a:prstGeom prst="rect">
+            <a:avLst/>
+          </a:prstGeom>
+          <a:noFill/>
+        </p:spPr>
+        <p:txBody>
+          <a:bodyPr wrap="none" rtlCol="0">
+            <a:spAutoFit/>
+          </a:bodyPr>
+          <a:lstStyle/>
+          <a:p>
+            <a:pPr algn="ctr"/>
+            <a:r>
+              <a:rPr lang="en-US" sz="2000" dirty="0" smtClean="0">
+                <a:ln w="0"/>
+                <a:effectLst>
+                  <a:outerShdw blurRad="38100" dist="19050" dir="2700000" algn="tl" rotWithShape="0">
+                    <a:schemeClr val="dk1">
+                      <a:alpha val="40000"/>
+                    </a:schemeClr>
+                  </a:outerShdw>
+                </a:effectLst>
                 <a:latin typeface="Times New Roman" panose="02020603050405020304" pitchFamily="18" charset="0"/>
                 <a:cs typeface="Times New Roman" panose="02020603050405020304" pitchFamily="18" charset="0"/>
               </a:rPr>
-              <a:t>Creating a post</a:t>
-            </a:r>
-          </a:p>
-          <a:p>
-            <a:r>
-              <a:rPr lang="en-US" dirty="0" smtClean="0">
+              <a:t>Tsvetelin Takiev</a:t>
+            </a:r>
+          </a:p>
+          <a:p>
+            <a:pPr algn="ctr"/>
+            <a:r>
+              <a:rPr lang="en-US" sz="2000" dirty="0" smtClean="0">
+                <a:ln w="0"/>
+                <a:effectLst>
+                  <a:outerShdw blurRad="38100" dist="19050" dir="2700000" algn="tl" rotWithShape="0">
+                    <a:schemeClr val="dk1">
+                      <a:alpha val="40000"/>
+                    </a:schemeClr>
+                  </a:outerShdw>
+                </a:effectLst>
                 <a:latin typeface="Times New Roman" panose="02020603050405020304" pitchFamily="18" charset="0"/>
                 <a:cs typeface="Times New Roman" panose="02020603050405020304" pitchFamily="18" charset="0"/>
               </a:rPr>
-              <a:t>Making an offer for a post</a:t>
-            </a:r>
-          </a:p>
-          <a:p>
-            <a:r>
-              <a:rPr lang="en-US" dirty="0" smtClean="0">
-                <a:latin typeface="Times New Roman" panose="02020603050405020304" pitchFamily="18" charset="0"/>
-                <a:cs typeface="Times New Roman" panose="02020603050405020304" pitchFamily="18" charset="0"/>
-              </a:rPr>
-              <a:t>Accepting offer from worker</a:t>
-            </a:r>
-          </a:p>
-          <a:p>
-            <a:r>
-              <a:rPr lang="en-US" dirty="0" smtClean="0">
-                <a:latin typeface="Times New Roman" panose="02020603050405020304" pitchFamily="18" charset="0"/>
-                <a:cs typeface="Times New Roman" panose="02020603050405020304" pitchFamily="18" charset="0"/>
-              </a:rPr>
-              <a:t>Comment and rate a worker</a:t>
-            </a:r>
-          </a:p>
-          <a:p>
-            <a:r>
-              <a:rPr lang="en-US" dirty="0" smtClean="0">
-                <a:latin typeface="Times New Roman" panose="02020603050405020304" pitchFamily="18" charset="0"/>
-                <a:cs typeface="Times New Roman" panose="02020603050405020304" pitchFamily="18" charset="0"/>
-              </a:rPr>
-              <a:t>Add category and delete category(admin)</a:t>
-            </a:r>
-          </a:p>
-          <a:p>
-            <a:endParaRPr lang="en-US" dirty="0" smtClean="0"/>
-          </a:p>
-          <a:p>
-            <a:endParaRPr lang="en-US" dirty="0"/>
+              <a:t>Student at New Bulgarian University</a:t>
+            </a:r>
+            <a:endParaRPr lang="en-US" sz="2000" dirty="0">
+              <a:ln w="0"/>
+              <a:effectLst>
+                <a:outerShdw blurRad="38100" dist="19050" dir="2700000" algn="tl" rotWithShape="0">
+                  <a:schemeClr val="dk1">
+                    <a:alpha val="40000"/>
+                  </a:schemeClr>
+                </a:outerShdw>
+              </a:effectLst>
+              <a:latin typeface="Times New Roman" panose="02020603050405020304" pitchFamily="18" charset="0"/>
+              <a:cs typeface="Times New Roman" panose="02020603050405020304" pitchFamily="18" charset="0"/>
+            </a:endParaRPr>
           </a:p>
         </p:txBody>
       </p:sp>
     </p:spTree>
     <p:extLst>
       <p:ext uri="{BB962C8B-B14F-4D97-AF65-F5344CB8AC3E}">
-        <p14:creationId xmlns:p14="http://schemas.microsoft.com/office/powerpoint/2010/main" val="2173907092"/>
+        <p14:creationId xmlns:p14="http://schemas.microsoft.com/office/powerpoint/2010/main" val="3859770023"/>
       </p:ext>
     </p:extLst>
   </p:cSld>
   <p:clrMapOvr>
     <a:masterClrMapping/>
   </p:clrMapOvr>
-  <p:timing>
-    <p:tnLst>
-      <p:par>
-        <p:cTn id="1" dur="indefinite" restart="never" nodeType="tmRoot"/>
-      </p:par>
-    </p:tnLst>
-  </p:timing>
 </p:sld>
 </file>
 
@@ -6054,12 +6149,13 @@
           <a:bodyPr/>
           <a:lstStyle/>
           <a:p>
+            <a:pPr algn="ctr"/>
             <a:r>
               <a:rPr lang="en-US" dirty="0" smtClean="0">
                 <a:latin typeface="Times New Roman" panose="02020603050405020304" pitchFamily="18" charset="0"/>
                 <a:cs typeface="Times New Roman" panose="02020603050405020304" pitchFamily="18" charset="0"/>
               </a:rPr>
-              <a:t>What we used?</a:t>
+              <a:t>Main functionality</a:t>
             </a:r>
             <a:endParaRPr lang="en-US" dirty="0">
               <a:latin typeface="Times New Roman" panose="02020603050405020304" pitchFamily="18" charset="0"/>
@@ -6078,36 +6174,17 @@
             <p:ph idx="1"/>
           </p:nvPr>
         </p:nvSpPr>
-        <p:spPr>
-          <a:xfrm>
-            <a:off x="677334" y="1872265"/>
-            <a:ext cx="3367444" cy="4363779"/>
-          </a:xfrm>
-        </p:spPr>
-        <p:txBody>
-          <a:bodyPr>
-            <a:normAutofit fontScale="92500" lnSpcReduction="10000"/>
-          </a:bodyPr>
-          <a:lstStyle/>
-          <a:p>
-            <a:pPr marL="0" indent="0">
-              <a:buNone/>
-            </a:pPr>
-            <a:r>
-              <a:rPr lang="en-US" sz="2000" u="sng" dirty="0" smtClean="0">
-                <a:latin typeface="Times New Roman" panose="02020603050405020304" pitchFamily="18" charset="0"/>
-                <a:cs typeface="Times New Roman" panose="02020603050405020304" pitchFamily="18" charset="0"/>
-              </a:rPr>
-              <a:t>Technologies and API’s</a:t>
-            </a:r>
-          </a:p>
+        <p:spPr/>
+        <p:txBody>
+          <a:bodyPr/>
+          <a:lstStyle/>
           <a:p>
             <a:r>
               <a:rPr lang="en-US" dirty="0" smtClean="0">
                 <a:latin typeface="Times New Roman" panose="02020603050405020304" pitchFamily="18" charset="0"/>
                 <a:cs typeface="Times New Roman" panose="02020603050405020304" pitchFamily="18" charset="0"/>
               </a:rPr>
-              <a:t>Java 8</a:t>
+              <a:t>Registration and login</a:t>
             </a:r>
           </a:p>
           <a:p>
@@ -6116,16 +6193,14 @@
                 <a:latin typeface="Times New Roman" panose="02020603050405020304" pitchFamily="18" charset="0"/>
                 <a:cs typeface="Times New Roman" panose="02020603050405020304" pitchFamily="18" charset="0"/>
               </a:rPr>
-              <a:t>Spring Boot</a:t>
-            </a:r>
-          </a:p>
-          <a:p>
+              <a:t>Upload a profile </a:t>
+            </a:r>
             <a:r>
               <a:rPr lang="en-US" dirty="0" smtClean="0">
                 <a:latin typeface="Times New Roman" panose="02020603050405020304" pitchFamily="18" charset="0"/>
                 <a:cs typeface="Times New Roman" panose="02020603050405020304" pitchFamily="18" charset="0"/>
               </a:rPr>
-              <a:t>Spring Rest</a:t>
+              <a:t>picture</a:t>
             </a:r>
           </a:p>
           <a:p>
@@ -6134,8 +6209,12 @@
                 <a:latin typeface="Times New Roman" panose="02020603050405020304" pitchFamily="18" charset="0"/>
                 <a:cs typeface="Times New Roman" panose="02020603050405020304" pitchFamily="18" charset="0"/>
               </a:rPr>
-              <a:t>Spring Data JPA</a:t>
-            </a:r>
+              <a:t>Email and SMS verification for account</a:t>
+            </a:r>
+            <a:endParaRPr lang="en-US" dirty="0" smtClean="0">
+              <a:latin typeface="Times New Roman" panose="02020603050405020304" pitchFamily="18" charset="0"/>
+              <a:cs typeface="Times New Roman" panose="02020603050405020304" pitchFamily="18" charset="0"/>
+            </a:endParaRPr>
           </a:p>
           <a:p>
             <a:r>
@@ -6143,7 +6222,7 @@
                 <a:latin typeface="Times New Roman" panose="02020603050405020304" pitchFamily="18" charset="0"/>
                 <a:cs typeface="Times New Roman" panose="02020603050405020304" pitchFamily="18" charset="0"/>
               </a:rPr>
-              <a:t>Maven</a:t>
+              <a:t>Creating a post</a:t>
             </a:r>
           </a:p>
           <a:p>
@@ -6152,7 +6231,7 @@
                 <a:latin typeface="Times New Roman" panose="02020603050405020304" pitchFamily="18" charset="0"/>
                 <a:cs typeface="Times New Roman" panose="02020603050405020304" pitchFamily="18" charset="0"/>
               </a:rPr>
-              <a:t>Hibernate</a:t>
+              <a:t>Making an offer for a post</a:t>
             </a:r>
           </a:p>
           <a:p>
@@ -6161,7 +6240,7 @@
                 <a:latin typeface="Times New Roman" panose="02020603050405020304" pitchFamily="18" charset="0"/>
                 <a:cs typeface="Times New Roman" panose="02020603050405020304" pitchFamily="18" charset="0"/>
               </a:rPr>
-              <a:t>JPA</a:t>
+              <a:t>Accepting offer from worker</a:t>
             </a:r>
           </a:p>
           <a:p>
@@ -6170,7 +6249,7 @@
                 <a:latin typeface="Times New Roman" panose="02020603050405020304" pitchFamily="18" charset="0"/>
                 <a:cs typeface="Times New Roman" panose="02020603050405020304" pitchFamily="18" charset="0"/>
               </a:rPr>
-              <a:t>MySQL</a:t>
+              <a:t>Comment and rate a worker</a:t>
             </a:r>
           </a:p>
           <a:p>
@@ -6179,349 +6258,21 @@
                 <a:latin typeface="Times New Roman" panose="02020603050405020304" pitchFamily="18" charset="0"/>
                 <a:cs typeface="Times New Roman" panose="02020603050405020304" pitchFamily="18" charset="0"/>
               </a:rPr>
-              <a:t>BCrypt</a:t>
-            </a:r>
-          </a:p>
-          <a:p>
-            <a:r>
-              <a:rPr lang="en-US" dirty="0" smtClean="0">
-                <a:latin typeface="Times New Roman" panose="02020603050405020304" pitchFamily="18" charset="0"/>
-                <a:cs typeface="Times New Roman" panose="02020603050405020304" pitchFamily="18" charset="0"/>
-              </a:rPr>
-              <a:t>Lombok</a:t>
-            </a:r>
-          </a:p>
-          <a:p>
-            <a:r>
-              <a:rPr lang="en-US" dirty="0" smtClean="0">
-                <a:latin typeface="Times New Roman" panose="02020603050405020304" pitchFamily="18" charset="0"/>
-                <a:cs typeface="Times New Roman" panose="02020603050405020304" pitchFamily="18" charset="0"/>
-              </a:rPr>
-              <a:t>Model Mapper</a:t>
-            </a:r>
-            <a:endParaRPr lang="en-US" dirty="0">
-              <a:latin typeface="Times New Roman" panose="02020603050405020304" pitchFamily="18" charset="0"/>
-              <a:cs typeface="Times New Roman" panose="02020603050405020304" pitchFamily="18" charset="0"/>
-            </a:endParaRPr>
-          </a:p>
-        </p:txBody>
-      </p:sp>
-      <p:sp>
-        <p:nvSpPr>
-          <p:cNvPr id="6" name="Content Placeholder 2"/>
-          <p:cNvSpPr txBox="1">
-            <a:spLocks/>
-          </p:cNvSpPr>
-          <p:nvPr/>
-        </p:nvSpPr>
-        <p:spPr>
-          <a:xfrm>
-            <a:off x="5286405" y="1872265"/>
-            <a:ext cx="3367444" cy="4363779"/>
-          </a:xfrm>
-          <a:prstGeom prst="rect">
-            <a:avLst/>
-          </a:prstGeom>
-        </p:spPr>
-        <p:txBody>
-          <a:bodyPr vert="horz" lIns="91440" tIns="45720" rIns="91440" bIns="45720" rtlCol="0">
-            <a:normAutofit/>
-          </a:bodyPr>
-          <a:lstStyle>
-            <a:lvl1pPr marL="342900" indent="-342900" algn="l" defTabSz="457200" rtl="0" eaLnBrk="1" latinLnBrk="0" hangingPunct="1">
-              <a:spcBef>
-                <a:spcPts val="1000"/>
-              </a:spcBef>
-              <a:spcAft>
-                <a:spcPts val="0"/>
-              </a:spcAft>
-              <a:buClr>
-                <a:schemeClr val="accent1"/>
-              </a:buClr>
-              <a:buSzPct val="80000"/>
-              <a:buFont typeface="Wingdings 3" charset="2"/>
-              <a:buChar char=""/>
-              <a:defRPr sz="1800" kern="1200">
-                <a:solidFill>
-                  <a:schemeClr val="tx1">
-                    <a:lumMod val="75000"/>
-                    <a:lumOff val="25000"/>
-                  </a:schemeClr>
-                </a:solidFill>
-                <a:latin typeface="+mn-lt"/>
-                <a:ea typeface="+mn-ea"/>
-                <a:cs typeface="+mn-cs"/>
-              </a:defRPr>
-            </a:lvl1pPr>
-            <a:lvl2pPr marL="742950" indent="-285750" algn="l" defTabSz="457200" rtl="0" eaLnBrk="1" latinLnBrk="0" hangingPunct="1">
-              <a:spcBef>
-                <a:spcPts val="1000"/>
-              </a:spcBef>
-              <a:spcAft>
-                <a:spcPts val="0"/>
-              </a:spcAft>
-              <a:buClr>
-                <a:schemeClr val="accent1"/>
-              </a:buClr>
-              <a:buSzPct val="80000"/>
-              <a:buFont typeface="Wingdings 3" charset="2"/>
-              <a:buChar char=""/>
-              <a:defRPr sz="1600" kern="1200">
-                <a:solidFill>
-                  <a:schemeClr val="tx1">
-                    <a:lumMod val="75000"/>
-                    <a:lumOff val="25000"/>
-                  </a:schemeClr>
-                </a:solidFill>
-                <a:latin typeface="+mn-lt"/>
-                <a:ea typeface="+mn-ea"/>
-                <a:cs typeface="+mn-cs"/>
-              </a:defRPr>
-            </a:lvl2pPr>
-            <a:lvl3pPr marL="1143000" indent="-228600" algn="l" defTabSz="457200" rtl="0" eaLnBrk="1" latinLnBrk="0" hangingPunct="1">
-              <a:spcBef>
-                <a:spcPts val="1000"/>
-              </a:spcBef>
-              <a:spcAft>
-                <a:spcPts val="0"/>
-              </a:spcAft>
-              <a:buClr>
-                <a:schemeClr val="accent1"/>
-              </a:buClr>
-              <a:buSzPct val="80000"/>
-              <a:buFont typeface="Wingdings 3" charset="2"/>
-              <a:buChar char=""/>
-              <a:defRPr sz="1400" kern="1200">
-                <a:solidFill>
-                  <a:schemeClr val="tx1">
-                    <a:lumMod val="75000"/>
-                    <a:lumOff val="25000"/>
-                  </a:schemeClr>
-                </a:solidFill>
-                <a:latin typeface="+mn-lt"/>
-                <a:ea typeface="+mn-ea"/>
-                <a:cs typeface="+mn-cs"/>
-              </a:defRPr>
-            </a:lvl3pPr>
-            <a:lvl4pPr marL="1600200" indent="-228600" algn="l" defTabSz="457200" rtl="0" eaLnBrk="1" latinLnBrk="0" hangingPunct="1">
-              <a:spcBef>
-                <a:spcPts val="1000"/>
-              </a:spcBef>
-              <a:spcAft>
-                <a:spcPts val="0"/>
-              </a:spcAft>
-              <a:buClr>
-                <a:schemeClr val="accent1"/>
-              </a:buClr>
-              <a:buSzPct val="80000"/>
-              <a:buFont typeface="Wingdings 3" charset="2"/>
-              <a:buChar char=""/>
-              <a:defRPr sz="1200" kern="1200">
-                <a:solidFill>
-                  <a:schemeClr val="tx1">
-                    <a:lumMod val="75000"/>
-                    <a:lumOff val="25000"/>
-                  </a:schemeClr>
-                </a:solidFill>
-                <a:latin typeface="+mn-lt"/>
-                <a:ea typeface="+mn-ea"/>
-                <a:cs typeface="+mn-cs"/>
-              </a:defRPr>
-            </a:lvl4pPr>
-            <a:lvl5pPr marL="2057400" indent="-228600" algn="l" defTabSz="457200" rtl="0" eaLnBrk="1" latinLnBrk="0" hangingPunct="1">
-              <a:spcBef>
-                <a:spcPts val="1000"/>
-              </a:spcBef>
-              <a:spcAft>
-                <a:spcPts val="0"/>
-              </a:spcAft>
-              <a:buClr>
-                <a:schemeClr val="accent1"/>
-              </a:buClr>
-              <a:buSzPct val="80000"/>
-              <a:buFont typeface="Wingdings 3" charset="2"/>
-              <a:buChar char=""/>
-              <a:defRPr sz="1200" kern="1200">
-                <a:solidFill>
-                  <a:schemeClr val="tx1">
-                    <a:lumMod val="75000"/>
-                    <a:lumOff val="25000"/>
-                  </a:schemeClr>
-                </a:solidFill>
-                <a:latin typeface="+mn-lt"/>
-                <a:ea typeface="+mn-ea"/>
-                <a:cs typeface="+mn-cs"/>
-              </a:defRPr>
-            </a:lvl5pPr>
-            <a:lvl6pPr marL="2514600" indent="-228600" algn="l" defTabSz="457200" rtl="0" eaLnBrk="1" latinLnBrk="0" hangingPunct="1">
-              <a:spcBef>
-                <a:spcPts val="1000"/>
-              </a:spcBef>
-              <a:spcAft>
-                <a:spcPts val="0"/>
-              </a:spcAft>
-              <a:buClr>
-                <a:schemeClr val="accent1"/>
-              </a:buClr>
-              <a:buSzPct val="80000"/>
-              <a:buFont typeface="Wingdings 3" charset="2"/>
-              <a:buChar char=""/>
-              <a:defRPr sz="1200" kern="1200">
-                <a:solidFill>
-                  <a:schemeClr val="tx1">
-                    <a:lumMod val="75000"/>
-                    <a:lumOff val="25000"/>
-                  </a:schemeClr>
-                </a:solidFill>
-                <a:latin typeface="+mn-lt"/>
-                <a:ea typeface="+mn-ea"/>
-                <a:cs typeface="+mn-cs"/>
-              </a:defRPr>
-            </a:lvl6pPr>
-            <a:lvl7pPr marL="2971800" indent="-228600" algn="l" defTabSz="457200" rtl="0" eaLnBrk="1" latinLnBrk="0" hangingPunct="1">
-              <a:spcBef>
-                <a:spcPts val="1000"/>
-              </a:spcBef>
-              <a:spcAft>
-                <a:spcPts val="0"/>
-              </a:spcAft>
-              <a:buClr>
-                <a:schemeClr val="accent1"/>
-              </a:buClr>
-              <a:buSzPct val="80000"/>
-              <a:buFont typeface="Wingdings 3" charset="2"/>
-              <a:buChar char=""/>
-              <a:defRPr sz="1200" kern="1200">
-                <a:solidFill>
-                  <a:schemeClr val="tx1">
-                    <a:lumMod val="75000"/>
-                    <a:lumOff val="25000"/>
-                  </a:schemeClr>
-                </a:solidFill>
-                <a:latin typeface="+mn-lt"/>
-                <a:ea typeface="+mn-ea"/>
-                <a:cs typeface="+mn-cs"/>
-              </a:defRPr>
-            </a:lvl7pPr>
-            <a:lvl8pPr marL="3429000" indent="-228600" algn="l" defTabSz="457200" rtl="0" eaLnBrk="1" latinLnBrk="0" hangingPunct="1">
-              <a:spcBef>
-                <a:spcPts val="1000"/>
-              </a:spcBef>
-              <a:spcAft>
-                <a:spcPts val="0"/>
-              </a:spcAft>
-              <a:buClr>
-                <a:schemeClr val="accent1"/>
-              </a:buClr>
-              <a:buSzPct val="80000"/>
-              <a:buFont typeface="Wingdings 3" charset="2"/>
-              <a:buChar char=""/>
-              <a:defRPr sz="1200" kern="1200">
-                <a:solidFill>
-                  <a:schemeClr val="tx1">
-                    <a:lumMod val="75000"/>
-                    <a:lumOff val="25000"/>
-                  </a:schemeClr>
-                </a:solidFill>
-                <a:latin typeface="+mn-lt"/>
-                <a:ea typeface="+mn-ea"/>
-                <a:cs typeface="+mn-cs"/>
-              </a:defRPr>
-            </a:lvl8pPr>
-            <a:lvl9pPr marL="3886200" indent="-228600" algn="l" defTabSz="457200" rtl="0" eaLnBrk="1" latinLnBrk="0" hangingPunct="1">
-              <a:spcBef>
-                <a:spcPts val="1000"/>
-              </a:spcBef>
-              <a:spcAft>
-                <a:spcPts val="0"/>
-              </a:spcAft>
-              <a:buClr>
-                <a:schemeClr val="accent1"/>
-              </a:buClr>
-              <a:buSzPct val="80000"/>
-              <a:buFont typeface="Wingdings 3" charset="2"/>
-              <a:buChar char=""/>
-              <a:defRPr sz="1200" kern="1200">
-                <a:solidFill>
-                  <a:schemeClr val="tx1">
-                    <a:lumMod val="75000"/>
-                    <a:lumOff val="25000"/>
-                  </a:schemeClr>
-                </a:solidFill>
-                <a:latin typeface="+mn-lt"/>
-                <a:ea typeface="+mn-ea"/>
-                <a:cs typeface="+mn-cs"/>
-              </a:defRPr>
-            </a:lvl9pPr>
-          </a:lstStyle>
-          <a:p>
-            <a:pPr marL="0" indent="0">
-              <a:buFont typeface="Wingdings 3" charset="2"/>
-              <a:buNone/>
-            </a:pPr>
-            <a:r>
-              <a:rPr lang="en-US" sz="2000" u="sng" dirty="0" smtClean="0">
-                <a:latin typeface="Times New Roman" panose="02020603050405020304" pitchFamily="18" charset="0"/>
-                <a:cs typeface="Times New Roman" panose="02020603050405020304" pitchFamily="18" charset="0"/>
-              </a:rPr>
-              <a:t>Software</a:t>
-            </a:r>
-          </a:p>
-          <a:p>
-            <a:r>
-              <a:rPr lang="en-US" dirty="0" smtClean="0">
-                <a:latin typeface="Times New Roman" panose="02020603050405020304" pitchFamily="18" charset="0"/>
-                <a:cs typeface="Times New Roman" panose="02020603050405020304" pitchFamily="18" charset="0"/>
-              </a:rPr>
-              <a:t>InteliJ IDEA</a:t>
-            </a:r>
-          </a:p>
-          <a:p>
-            <a:r>
-              <a:rPr lang="en-US" dirty="0" smtClean="0">
-                <a:latin typeface="Times New Roman" panose="02020603050405020304" pitchFamily="18" charset="0"/>
-                <a:cs typeface="Times New Roman" panose="02020603050405020304" pitchFamily="18" charset="0"/>
-              </a:rPr>
-              <a:t>Postman</a:t>
-            </a:r>
-          </a:p>
-          <a:p>
-            <a:r>
-              <a:rPr lang="en-US" dirty="0" smtClean="0">
-                <a:latin typeface="Times New Roman" panose="02020603050405020304" pitchFamily="18" charset="0"/>
-                <a:cs typeface="Times New Roman" panose="02020603050405020304" pitchFamily="18" charset="0"/>
-              </a:rPr>
-              <a:t>Git</a:t>
-            </a:r>
-          </a:p>
-          <a:p>
-            <a:endParaRPr lang="en-US" dirty="0" smtClean="0">
-              <a:latin typeface="Times New Roman" panose="02020603050405020304" pitchFamily="18" charset="0"/>
-              <a:cs typeface="Times New Roman" panose="02020603050405020304" pitchFamily="18" charset="0"/>
-            </a:endParaRPr>
-          </a:p>
-          <a:p>
-            <a:pPr marL="0" indent="0">
-              <a:buFont typeface="Wingdings 3" charset="2"/>
-              <a:buNone/>
-            </a:pPr>
-            <a:endParaRPr lang="en-US" sz="2000" u="sng" dirty="0" smtClean="0">
-              <a:latin typeface="Times New Roman" panose="02020603050405020304" pitchFamily="18" charset="0"/>
-              <a:cs typeface="Times New Roman" panose="02020603050405020304" pitchFamily="18" charset="0"/>
-            </a:endParaRPr>
-          </a:p>
-          <a:p>
-            <a:endParaRPr lang="en-US" dirty="0" smtClean="0">
-              <a:latin typeface="Times New Roman" panose="02020603050405020304" pitchFamily="18" charset="0"/>
-              <a:cs typeface="Times New Roman" panose="02020603050405020304" pitchFamily="18" charset="0"/>
-            </a:endParaRPr>
+              <a:t>Add category and delete category(admin)</a:t>
+            </a:r>
+          </a:p>
+          <a:p>
+            <a:endParaRPr lang="en-US" dirty="0" smtClean="0"/>
+          </a:p>
+          <a:p>
+            <a:endParaRPr lang="en-US" dirty="0"/>
           </a:p>
         </p:txBody>
       </p:sp>
     </p:spTree>
     <p:extLst>
       <p:ext uri="{BB962C8B-B14F-4D97-AF65-F5344CB8AC3E}">
-        <p14:creationId xmlns:p14="http://schemas.microsoft.com/office/powerpoint/2010/main" val="1626669156"/>
+        <p14:creationId xmlns:p14="http://schemas.microsoft.com/office/powerpoint/2010/main" val="2173907092"/>
       </p:ext>
     </p:extLst>
   </p:cSld>
@@ -6565,12 +6316,7 @@
             <p:ph type="title"/>
           </p:nvPr>
         </p:nvSpPr>
-        <p:spPr>
-          <a:xfrm>
-            <a:off x="0" y="0"/>
-            <a:ext cx="8596668" cy="1320800"/>
-          </a:xfrm>
-        </p:spPr>
+        <p:spPr/>
         <p:txBody>
           <a:bodyPr/>
           <a:lstStyle/>
@@ -6580,7 +6326,7 @@
                 <a:latin typeface="Times New Roman" panose="02020603050405020304" pitchFamily="18" charset="0"/>
                 <a:cs typeface="Times New Roman" panose="02020603050405020304" pitchFamily="18" charset="0"/>
               </a:rPr>
-              <a:t>Database</a:t>
+              <a:t>What we used?</a:t>
             </a:r>
             <a:endParaRPr lang="en-US" dirty="0">
               <a:latin typeface="Times New Roman" panose="02020603050405020304" pitchFamily="18" charset="0"/>
@@ -6589,39 +6335,512 @@
           </a:p>
         </p:txBody>
       </p:sp>
-      <p:pic>
-        <p:nvPicPr>
-          <p:cNvPr id="4" name="Content Placeholder 3"/>
-          <p:cNvPicPr>
-            <a:picLocks noGrp="1" noChangeAspect="1"/>
-          </p:cNvPicPr>
+      <p:sp>
+        <p:nvSpPr>
+          <p:cNvPr id="3" name="Content Placeholder 2"/>
+          <p:cNvSpPr>
+            <a:spLocks noGrp="1"/>
+          </p:cNvSpPr>
           <p:nvPr>
             <p:ph idx="1"/>
           </p:nvPr>
-        </p:nvPicPr>
-        <p:blipFill>
-          <a:blip r:embed="rId2">
-            <a:extLst>
-              <a:ext uri="{28A0092B-C50C-407E-A947-70E740481C1C}">
-                <a14:useLocalDpi xmlns:a14="http://schemas.microsoft.com/office/drawing/2010/main" val="0"/>
-              </a:ext>
-            </a:extLst>
-          </a:blip>
-          <a:stretch>
-            <a:fillRect/>
-          </a:stretch>
-        </p:blipFill>
+        </p:nvSpPr>
         <p:spPr>
           <a:xfrm>
-            <a:off x="1912343" y="0"/>
-            <a:ext cx="8599138" cy="6865280"/>
+            <a:off x="677334" y="1575703"/>
+            <a:ext cx="3367444" cy="4783908"/>
           </a:xfrm>
         </p:spPr>
-      </p:pic>
+        <p:txBody>
+          <a:bodyPr>
+            <a:normAutofit fontScale="85000" lnSpcReduction="20000"/>
+          </a:bodyPr>
+          <a:lstStyle/>
+          <a:p>
+            <a:pPr marL="0" indent="0">
+              <a:buNone/>
+            </a:pPr>
+            <a:r>
+              <a:rPr lang="en-US" sz="2000" u="sng" dirty="0" smtClean="0">
+                <a:latin typeface="Times New Roman" panose="02020603050405020304" pitchFamily="18" charset="0"/>
+                <a:cs typeface="Times New Roman" panose="02020603050405020304" pitchFamily="18" charset="0"/>
+              </a:rPr>
+              <a:t>Technologies and API’s</a:t>
+            </a:r>
+          </a:p>
+          <a:p>
+            <a:r>
+              <a:rPr lang="en-US" dirty="0" smtClean="0">
+                <a:latin typeface="Times New Roman" panose="02020603050405020304" pitchFamily="18" charset="0"/>
+                <a:cs typeface="Times New Roman" panose="02020603050405020304" pitchFamily="18" charset="0"/>
+              </a:rPr>
+              <a:t>Java 8</a:t>
+            </a:r>
+          </a:p>
+          <a:p>
+            <a:r>
+              <a:rPr lang="en-US" dirty="0" smtClean="0">
+                <a:latin typeface="Times New Roman" panose="02020603050405020304" pitchFamily="18" charset="0"/>
+                <a:cs typeface="Times New Roman" panose="02020603050405020304" pitchFamily="18" charset="0"/>
+              </a:rPr>
+              <a:t>Spring Boot</a:t>
+            </a:r>
+          </a:p>
+          <a:p>
+            <a:r>
+              <a:rPr lang="en-US" dirty="0" smtClean="0">
+                <a:latin typeface="Times New Roman" panose="02020603050405020304" pitchFamily="18" charset="0"/>
+                <a:cs typeface="Times New Roman" panose="02020603050405020304" pitchFamily="18" charset="0"/>
+              </a:rPr>
+              <a:t>Spring Rest</a:t>
+            </a:r>
+          </a:p>
+          <a:p>
+            <a:r>
+              <a:rPr lang="en-US" dirty="0" smtClean="0">
+                <a:latin typeface="Times New Roman" panose="02020603050405020304" pitchFamily="18" charset="0"/>
+                <a:cs typeface="Times New Roman" panose="02020603050405020304" pitchFamily="18" charset="0"/>
+              </a:rPr>
+              <a:t>Spring Data JPA</a:t>
+            </a:r>
+          </a:p>
+          <a:p>
+            <a:r>
+              <a:rPr lang="en-US" dirty="0" smtClean="0">
+                <a:latin typeface="Times New Roman" panose="02020603050405020304" pitchFamily="18" charset="0"/>
+                <a:cs typeface="Times New Roman" panose="02020603050405020304" pitchFamily="18" charset="0"/>
+              </a:rPr>
+              <a:t>Maven</a:t>
+            </a:r>
+          </a:p>
+          <a:p>
+            <a:r>
+              <a:rPr lang="en-US" dirty="0" smtClean="0">
+                <a:latin typeface="Times New Roman" panose="02020603050405020304" pitchFamily="18" charset="0"/>
+                <a:cs typeface="Times New Roman" panose="02020603050405020304" pitchFamily="18" charset="0"/>
+              </a:rPr>
+              <a:t>Hibernate</a:t>
+            </a:r>
+          </a:p>
+          <a:p>
+            <a:r>
+              <a:rPr lang="en-US" dirty="0" smtClean="0">
+                <a:latin typeface="Times New Roman" panose="02020603050405020304" pitchFamily="18" charset="0"/>
+                <a:cs typeface="Times New Roman" panose="02020603050405020304" pitchFamily="18" charset="0"/>
+              </a:rPr>
+              <a:t>JPA</a:t>
+            </a:r>
+          </a:p>
+          <a:p>
+            <a:r>
+              <a:rPr lang="en-US" dirty="0" smtClean="0">
+                <a:latin typeface="Times New Roman" panose="02020603050405020304" pitchFamily="18" charset="0"/>
+                <a:cs typeface="Times New Roman" panose="02020603050405020304" pitchFamily="18" charset="0"/>
+              </a:rPr>
+              <a:t>MySQL</a:t>
+            </a:r>
+          </a:p>
+          <a:p>
+            <a:r>
+              <a:rPr lang="en-US" dirty="0" smtClean="0">
+                <a:latin typeface="Times New Roman" panose="02020603050405020304" pitchFamily="18" charset="0"/>
+                <a:cs typeface="Times New Roman" panose="02020603050405020304" pitchFamily="18" charset="0"/>
+              </a:rPr>
+              <a:t>BCrypt</a:t>
+            </a:r>
+          </a:p>
+          <a:p>
+            <a:r>
+              <a:rPr lang="en-US" dirty="0" smtClean="0">
+                <a:latin typeface="Times New Roman" panose="02020603050405020304" pitchFamily="18" charset="0"/>
+                <a:cs typeface="Times New Roman" panose="02020603050405020304" pitchFamily="18" charset="0"/>
+              </a:rPr>
+              <a:t>Lombok</a:t>
+            </a:r>
+          </a:p>
+          <a:p>
+            <a:r>
+              <a:rPr lang="en-US" dirty="0" smtClean="0">
+                <a:latin typeface="Times New Roman" panose="02020603050405020304" pitchFamily="18" charset="0"/>
+                <a:cs typeface="Times New Roman" panose="02020603050405020304" pitchFamily="18" charset="0"/>
+              </a:rPr>
+              <a:t>Model </a:t>
+            </a:r>
+            <a:r>
+              <a:rPr lang="en-US" dirty="0" smtClean="0">
+                <a:latin typeface="Times New Roman" panose="02020603050405020304" pitchFamily="18" charset="0"/>
+                <a:cs typeface="Times New Roman" panose="02020603050405020304" pitchFamily="18" charset="0"/>
+              </a:rPr>
+              <a:t>Mapper</a:t>
+            </a:r>
+          </a:p>
+          <a:p>
+            <a:r>
+              <a:rPr lang="en-US" dirty="0" smtClean="0">
+                <a:latin typeface="Times New Roman" panose="02020603050405020304" pitchFamily="18" charset="0"/>
+                <a:cs typeface="Times New Roman" panose="02020603050405020304" pitchFamily="18" charset="0"/>
+              </a:rPr>
+              <a:t>Twilio</a:t>
+            </a:r>
+          </a:p>
+          <a:p>
+            <a:r>
+              <a:rPr lang="en-US" dirty="0" smtClean="0">
+                <a:latin typeface="Times New Roman" panose="02020603050405020304" pitchFamily="18" charset="0"/>
+                <a:cs typeface="Times New Roman" panose="02020603050405020304" pitchFamily="18" charset="0"/>
+              </a:rPr>
+              <a:t>Scoop</a:t>
+            </a:r>
+          </a:p>
+          <a:p>
+            <a:r>
+              <a:rPr lang="en-US" dirty="0" smtClean="0">
+                <a:latin typeface="Times New Roman" panose="02020603050405020304" pitchFamily="18" charset="0"/>
+                <a:cs typeface="Times New Roman" panose="02020603050405020304" pitchFamily="18" charset="0"/>
+              </a:rPr>
+              <a:t>Java MailSender</a:t>
+            </a:r>
+          </a:p>
+          <a:p>
+            <a:pPr marL="0" indent="0">
+              <a:buNone/>
+            </a:pPr>
+            <a:endParaRPr lang="en-US" dirty="0">
+              <a:latin typeface="Times New Roman" panose="02020603050405020304" pitchFamily="18" charset="0"/>
+              <a:cs typeface="Times New Roman" panose="02020603050405020304" pitchFamily="18" charset="0"/>
+            </a:endParaRPr>
+          </a:p>
+        </p:txBody>
+      </p:sp>
+      <p:sp>
+        <p:nvSpPr>
+          <p:cNvPr id="6" name="Content Placeholder 2"/>
+          <p:cNvSpPr txBox="1">
+            <a:spLocks/>
+          </p:cNvSpPr>
+          <p:nvPr/>
+        </p:nvSpPr>
+        <p:spPr>
+          <a:xfrm>
+            <a:off x="5302880" y="1575703"/>
+            <a:ext cx="3367444" cy="4363779"/>
+          </a:xfrm>
+          <a:prstGeom prst="rect">
+            <a:avLst/>
+          </a:prstGeom>
+        </p:spPr>
+        <p:txBody>
+          <a:bodyPr vert="horz" lIns="91440" tIns="45720" rIns="91440" bIns="45720" rtlCol="0">
+            <a:normAutofit/>
+          </a:bodyPr>
+          <a:lstStyle>
+            <a:lvl1pPr marL="342900" indent="-342900" algn="l" defTabSz="457200" rtl="0" eaLnBrk="1" latinLnBrk="0" hangingPunct="1">
+              <a:spcBef>
+                <a:spcPts val="1000"/>
+              </a:spcBef>
+              <a:spcAft>
+                <a:spcPts val="0"/>
+              </a:spcAft>
+              <a:buClr>
+                <a:schemeClr val="accent1"/>
+              </a:buClr>
+              <a:buSzPct val="80000"/>
+              <a:buFont typeface="Wingdings 3" charset="2"/>
+              <a:buChar char=""/>
+              <a:defRPr sz="1800" kern="1200">
+                <a:solidFill>
+                  <a:schemeClr val="tx1">
+                    <a:lumMod val="75000"/>
+                    <a:lumOff val="25000"/>
+                  </a:schemeClr>
+                </a:solidFill>
+                <a:latin typeface="+mn-lt"/>
+                <a:ea typeface="+mn-ea"/>
+                <a:cs typeface="+mn-cs"/>
+              </a:defRPr>
+            </a:lvl1pPr>
+            <a:lvl2pPr marL="742950" indent="-285750" algn="l" defTabSz="457200" rtl="0" eaLnBrk="1" latinLnBrk="0" hangingPunct="1">
+              <a:spcBef>
+                <a:spcPts val="1000"/>
+              </a:spcBef>
+              <a:spcAft>
+                <a:spcPts val="0"/>
+              </a:spcAft>
+              <a:buClr>
+                <a:schemeClr val="accent1"/>
+              </a:buClr>
+              <a:buSzPct val="80000"/>
+              <a:buFont typeface="Wingdings 3" charset="2"/>
+              <a:buChar char=""/>
+              <a:defRPr sz="1600" kern="1200">
+                <a:solidFill>
+                  <a:schemeClr val="tx1">
+                    <a:lumMod val="75000"/>
+                    <a:lumOff val="25000"/>
+                  </a:schemeClr>
+                </a:solidFill>
+                <a:latin typeface="+mn-lt"/>
+                <a:ea typeface="+mn-ea"/>
+                <a:cs typeface="+mn-cs"/>
+              </a:defRPr>
+            </a:lvl2pPr>
+            <a:lvl3pPr marL="1143000" indent="-228600" algn="l" defTabSz="457200" rtl="0" eaLnBrk="1" latinLnBrk="0" hangingPunct="1">
+              <a:spcBef>
+                <a:spcPts val="1000"/>
+              </a:spcBef>
+              <a:spcAft>
+                <a:spcPts val="0"/>
+              </a:spcAft>
+              <a:buClr>
+                <a:schemeClr val="accent1"/>
+              </a:buClr>
+              <a:buSzPct val="80000"/>
+              <a:buFont typeface="Wingdings 3" charset="2"/>
+              <a:buChar char=""/>
+              <a:defRPr sz="1400" kern="1200">
+                <a:solidFill>
+                  <a:schemeClr val="tx1">
+                    <a:lumMod val="75000"/>
+                    <a:lumOff val="25000"/>
+                  </a:schemeClr>
+                </a:solidFill>
+                <a:latin typeface="+mn-lt"/>
+                <a:ea typeface="+mn-ea"/>
+                <a:cs typeface="+mn-cs"/>
+              </a:defRPr>
+            </a:lvl3pPr>
+            <a:lvl4pPr marL="1600200" indent="-228600" algn="l" defTabSz="457200" rtl="0" eaLnBrk="1" latinLnBrk="0" hangingPunct="1">
+              <a:spcBef>
+                <a:spcPts val="1000"/>
+              </a:spcBef>
+              <a:spcAft>
+                <a:spcPts val="0"/>
+              </a:spcAft>
+              <a:buClr>
+                <a:schemeClr val="accent1"/>
+              </a:buClr>
+              <a:buSzPct val="80000"/>
+              <a:buFont typeface="Wingdings 3" charset="2"/>
+              <a:buChar char=""/>
+              <a:defRPr sz="1200" kern="1200">
+                <a:solidFill>
+                  <a:schemeClr val="tx1">
+                    <a:lumMod val="75000"/>
+                    <a:lumOff val="25000"/>
+                  </a:schemeClr>
+                </a:solidFill>
+                <a:latin typeface="+mn-lt"/>
+                <a:ea typeface="+mn-ea"/>
+                <a:cs typeface="+mn-cs"/>
+              </a:defRPr>
+            </a:lvl4pPr>
+            <a:lvl5pPr marL="2057400" indent="-228600" algn="l" defTabSz="457200" rtl="0" eaLnBrk="1" latinLnBrk="0" hangingPunct="1">
+              <a:spcBef>
+                <a:spcPts val="1000"/>
+              </a:spcBef>
+              <a:spcAft>
+                <a:spcPts val="0"/>
+              </a:spcAft>
+              <a:buClr>
+                <a:schemeClr val="accent1"/>
+              </a:buClr>
+              <a:buSzPct val="80000"/>
+              <a:buFont typeface="Wingdings 3" charset="2"/>
+              <a:buChar char=""/>
+              <a:defRPr sz="1200" kern="1200">
+                <a:solidFill>
+                  <a:schemeClr val="tx1">
+                    <a:lumMod val="75000"/>
+                    <a:lumOff val="25000"/>
+                  </a:schemeClr>
+                </a:solidFill>
+                <a:latin typeface="+mn-lt"/>
+                <a:ea typeface="+mn-ea"/>
+                <a:cs typeface="+mn-cs"/>
+              </a:defRPr>
+            </a:lvl5pPr>
+            <a:lvl6pPr marL="2514600" indent="-228600" algn="l" defTabSz="457200" rtl="0" eaLnBrk="1" latinLnBrk="0" hangingPunct="1">
+              <a:spcBef>
+                <a:spcPts val="1000"/>
+              </a:spcBef>
+              <a:spcAft>
+                <a:spcPts val="0"/>
+              </a:spcAft>
+              <a:buClr>
+                <a:schemeClr val="accent1"/>
+              </a:buClr>
+              <a:buSzPct val="80000"/>
+              <a:buFont typeface="Wingdings 3" charset="2"/>
+              <a:buChar char=""/>
+              <a:defRPr sz="1200" kern="1200">
+                <a:solidFill>
+                  <a:schemeClr val="tx1">
+                    <a:lumMod val="75000"/>
+                    <a:lumOff val="25000"/>
+                  </a:schemeClr>
+                </a:solidFill>
+                <a:latin typeface="+mn-lt"/>
+                <a:ea typeface="+mn-ea"/>
+                <a:cs typeface="+mn-cs"/>
+              </a:defRPr>
+            </a:lvl6pPr>
+            <a:lvl7pPr marL="2971800" indent="-228600" algn="l" defTabSz="457200" rtl="0" eaLnBrk="1" latinLnBrk="0" hangingPunct="1">
+              <a:spcBef>
+                <a:spcPts val="1000"/>
+              </a:spcBef>
+              <a:spcAft>
+                <a:spcPts val="0"/>
+              </a:spcAft>
+              <a:buClr>
+                <a:schemeClr val="accent1"/>
+              </a:buClr>
+              <a:buSzPct val="80000"/>
+              <a:buFont typeface="Wingdings 3" charset="2"/>
+              <a:buChar char=""/>
+              <a:defRPr sz="1200" kern="1200">
+                <a:solidFill>
+                  <a:schemeClr val="tx1">
+                    <a:lumMod val="75000"/>
+                    <a:lumOff val="25000"/>
+                  </a:schemeClr>
+                </a:solidFill>
+                <a:latin typeface="+mn-lt"/>
+                <a:ea typeface="+mn-ea"/>
+                <a:cs typeface="+mn-cs"/>
+              </a:defRPr>
+            </a:lvl7pPr>
+            <a:lvl8pPr marL="3429000" indent="-228600" algn="l" defTabSz="457200" rtl="0" eaLnBrk="1" latinLnBrk="0" hangingPunct="1">
+              <a:spcBef>
+                <a:spcPts val="1000"/>
+              </a:spcBef>
+              <a:spcAft>
+                <a:spcPts val="0"/>
+              </a:spcAft>
+              <a:buClr>
+                <a:schemeClr val="accent1"/>
+              </a:buClr>
+              <a:buSzPct val="80000"/>
+              <a:buFont typeface="Wingdings 3" charset="2"/>
+              <a:buChar char=""/>
+              <a:defRPr sz="1200" kern="1200">
+                <a:solidFill>
+                  <a:schemeClr val="tx1">
+                    <a:lumMod val="75000"/>
+                    <a:lumOff val="25000"/>
+                  </a:schemeClr>
+                </a:solidFill>
+                <a:latin typeface="+mn-lt"/>
+                <a:ea typeface="+mn-ea"/>
+                <a:cs typeface="+mn-cs"/>
+              </a:defRPr>
+            </a:lvl8pPr>
+            <a:lvl9pPr marL="3886200" indent="-228600" algn="l" defTabSz="457200" rtl="0" eaLnBrk="1" latinLnBrk="0" hangingPunct="1">
+              <a:spcBef>
+                <a:spcPts val="1000"/>
+              </a:spcBef>
+              <a:spcAft>
+                <a:spcPts val="0"/>
+              </a:spcAft>
+              <a:buClr>
+                <a:schemeClr val="accent1"/>
+              </a:buClr>
+              <a:buSzPct val="80000"/>
+              <a:buFont typeface="Wingdings 3" charset="2"/>
+              <a:buChar char=""/>
+              <a:defRPr sz="1200" kern="1200">
+                <a:solidFill>
+                  <a:schemeClr val="tx1">
+                    <a:lumMod val="75000"/>
+                    <a:lumOff val="25000"/>
+                  </a:schemeClr>
+                </a:solidFill>
+                <a:latin typeface="+mn-lt"/>
+                <a:ea typeface="+mn-ea"/>
+                <a:cs typeface="+mn-cs"/>
+              </a:defRPr>
+            </a:lvl9pPr>
+          </a:lstStyle>
+          <a:p>
+            <a:pPr marL="0" indent="0">
+              <a:buFont typeface="Wingdings 3" charset="2"/>
+              <a:buNone/>
+            </a:pPr>
+            <a:r>
+              <a:rPr lang="en-US" sz="2000" u="sng" dirty="0" smtClean="0">
+                <a:latin typeface="Times New Roman" panose="02020603050405020304" pitchFamily="18" charset="0"/>
+                <a:cs typeface="Times New Roman" panose="02020603050405020304" pitchFamily="18" charset="0"/>
+              </a:rPr>
+              <a:t>Software</a:t>
+            </a:r>
+          </a:p>
+          <a:p>
+            <a:r>
+              <a:rPr lang="en-US" dirty="0" smtClean="0">
+                <a:latin typeface="Times New Roman" panose="02020603050405020304" pitchFamily="18" charset="0"/>
+                <a:cs typeface="Times New Roman" panose="02020603050405020304" pitchFamily="18" charset="0"/>
+              </a:rPr>
+              <a:t>InteliJ IDEA</a:t>
+            </a:r>
+          </a:p>
+          <a:p>
+            <a:r>
+              <a:rPr lang="en-US" dirty="0" smtClean="0">
+                <a:latin typeface="Times New Roman" panose="02020603050405020304" pitchFamily="18" charset="0"/>
+                <a:cs typeface="Times New Roman" panose="02020603050405020304" pitchFamily="18" charset="0"/>
+              </a:rPr>
+              <a:t>Postman</a:t>
+            </a:r>
+          </a:p>
+          <a:p>
+            <a:r>
+              <a:rPr lang="en-US" dirty="0" smtClean="0">
+                <a:latin typeface="Times New Roman" panose="02020603050405020304" pitchFamily="18" charset="0"/>
+                <a:cs typeface="Times New Roman" panose="02020603050405020304" pitchFamily="18" charset="0"/>
+              </a:rPr>
+              <a:t>Git</a:t>
+            </a:r>
+          </a:p>
+          <a:p>
+            <a:r>
+              <a:rPr lang="en-US" dirty="0" smtClean="0">
+                <a:latin typeface="Times New Roman" panose="02020603050405020304" pitchFamily="18" charset="0"/>
+                <a:cs typeface="Times New Roman" panose="02020603050405020304" pitchFamily="18" charset="0"/>
+              </a:rPr>
+              <a:t>MySQL Workbench</a:t>
+            </a:r>
+            <a:endParaRPr lang="en-US" dirty="0" smtClean="0">
+              <a:latin typeface="Times New Roman" panose="02020603050405020304" pitchFamily="18" charset="0"/>
+              <a:cs typeface="Times New Roman" panose="02020603050405020304" pitchFamily="18" charset="0"/>
+            </a:endParaRPr>
+          </a:p>
+          <a:p>
+            <a:endParaRPr lang="en-US" dirty="0" smtClean="0">
+              <a:latin typeface="Times New Roman" panose="02020603050405020304" pitchFamily="18" charset="0"/>
+              <a:cs typeface="Times New Roman" panose="02020603050405020304" pitchFamily="18" charset="0"/>
+            </a:endParaRPr>
+          </a:p>
+          <a:p>
+            <a:pPr marL="0" indent="0">
+              <a:buFont typeface="Wingdings 3" charset="2"/>
+              <a:buNone/>
+            </a:pPr>
+            <a:endParaRPr lang="en-US" sz="2000" u="sng" dirty="0" smtClean="0">
+              <a:latin typeface="Times New Roman" panose="02020603050405020304" pitchFamily="18" charset="0"/>
+              <a:cs typeface="Times New Roman" panose="02020603050405020304" pitchFamily="18" charset="0"/>
+            </a:endParaRPr>
+          </a:p>
+          <a:p>
+            <a:endParaRPr lang="en-US" dirty="0" smtClean="0">
+              <a:latin typeface="Times New Roman" panose="02020603050405020304" pitchFamily="18" charset="0"/>
+              <a:cs typeface="Times New Roman" panose="02020603050405020304" pitchFamily="18" charset="0"/>
+            </a:endParaRPr>
+          </a:p>
+        </p:txBody>
+      </p:sp>
     </p:spTree>
     <p:extLst>
       <p:ext uri="{BB962C8B-B14F-4D97-AF65-F5344CB8AC3E}">
-        <p14:creationId xmlns:p14="http://schemas.microsoft.com/office/powerpoint/2010/main" val="552072151"/>
+        <p14:creationId xmlns:p14="http://schemas.microsoft.com/office/powerpoint/2010/main" val="1626669156"/>
       </p:ext>
     </p:extLst>
   </p:cSld>
@@ -6680,6 +6899,106 @@
                 <a:latin typeface="Times New Roman" panose="02020603050405020304" pitchFamily="18" charset="0"/>
                 <a:cs typeface="Times New Roman" panose="02020603050405020304" pitchFamily="18" charset="0"/>
               </a:rPr>
+              <a:t>Database</a:t>
+            </a:r>
+            <a:endParaRPr lang="en-US" dirty="0">
+              <a:latin typeface="Times New Roman" panose="02020603050405020304" pitchFamily="18" charset="0"/>
+              <a:cs typeface="Times New Roman" panose="02020603050405020304" pitchFamily="18" charset="0"/>
+            </a:endParaRPr>
+          </a:p>
+        </p:txBody>
+      </p:sp>
+      <p:pic>
+        <p:nvPicPr>
+          <p:cNvPr id="5" name="Content Placeholder 4"/>
+          <p:cNvPicPr>
+            <a:picLocks noGrp="1" noChangeAspect="1"/>
+          </p:cNvPicPr>
+          <p:nvPr>
+            <p:ph idx="1"/>
+          </p:nvPr>
+        </p:nvPicPr>
+        <p:blipFill>
+          <a:blip r:embed="rId2">
+            <a:extLst>
+              <a:ext uri="{28A0092B-C50C-407E-A947-70E740481C1C}">
+                <a14:useLocalDpi xmlns:a14="http://schemas.microsoft.com/office/drawing/2010/main" val="0"/>
+              </a:ext>
+            </a:extLst>
+          </a:blip>
+          <a:stretch>
+            <a:fillRect/>
+          </a:stretch>
+        </p:blipFill>
+        <p:spPr>
+          <a:xfrm>
+            <a:off x="1766324" y="0"/>
+            <a:ext cx="8810817" cy="6858000"/>
+          </a:xfrm>
+        </p:spPr>
+      </p:pic>
+    </p:spTree>
+    <p:extLst>
+      <p:ext uri="{BB962C8B-B14F-4D97-AF65-F5344CB8AC3E}">
+        <p14:creationId xmlns:p14="http://schemas.microsoft.com/office/powerpoint/2010/main" val="552072151"/>
+      </p:ext>
+    </p:extLst>
+  </p:cSld>
+  <p:clrMapOvr>
+    <a:masterClrMapping/>
+  </p:clrMapOvr>
+  <p:timing>
+    <p:tnLst>
+      <p:par>
+        <p:cTn id="1" dur="indefinite" restart="never" nodeType="tmRoot"/>
+      </p:par>
+    </p:tnLst>
+  </p:timing>
+</p:sld>
+</file>
+
+<file path=ppt/slides/slide6.xml><?xml version="1.0" encoding="utf-8"?>
+<p:sld xmlns:a="http://schemas.openxmlformats.org/drawingml/2006/main" xmlns:r="http://schemas.openxmlformats.org/officeDocument/2006/relationships" xmlns:p="http://schemas.openxmlformats.org/presentationml/2006/main">
+  <p:cSld>
+    <p:spTree>
+      <p:nvGrpSpPr>
+        <p:cNvPr id="1" name=""/>
+        <p:cNvGrpSpPr/>
+        <p:nvPr/>
+      </p:nvGrpSpPr>
+      <p:grpSpPr>
+        <a:xfrm>
+          <a:off x="0" y="0"/>
+          <a:ext cx="0" cy="0"/>
+          <a:chOff x="0" y="0"/>
+          <a:chExt cx="0" cy="0"/>
+        </a:xfrm>
+      </p:grpSpPr>
+      <p:sp>
+        <p:nvSpPr>
+          <p:cNvPr id="2" name="Title 1"/>
+          <p:cNvSpPr>
+            <a:spLocks noGrp="1"/>
+          </p:cNvSpPr>
+          <p:nvPr>
+            <p:ph type="title"/>
+          </p:nvPr>
+        </p:nvSpPr>
+        <p:spPr>
+          <a:xfrm>
+            <a:off x="0" y="0"/>
+            <a:ext cx="8596668" cy="1320800"/>
+          </a:xfrm>
+        </p:spPr>
+        <p:txBody>
+          <a:bodyPr/>
+          <a:lstStyle/>
+          <a:p>
+            <a:r>
+              <a:rPr lang="en-US" dirty="0" smtClean="0">
+                <a:latin typeface="Times New Roman" panose="02020603050405020304" pitchFamily="18" charset="0"/>
+                <a:cs typeface="Times New Roman" panose="02020603050405020304" pitchFamily="18" charset="0"/>
+              </a:rPr>
               <a:t>Class structure</a:t>
             </a:r>
             <a:endParaRPr lang="en-US" dirty="0">
@@ -6705,7 +7024,7 @@
         </p:blipFill>
         <p:spPr>
           <a:xfrm>
-            <a:off x="6151735" y="918904"/>
+            <a:off x="6135259" y="918904"/>
             <a:ext cx="1885950" cy="1733550"/>
           </a:xfrm>
           <a:prstGeom prst="rect">
@@ -6777,7 +7096,7 @@
         </p:blipFill>
         <p:spPr>
           <a:xfrm>
-            <a:off x="5958145" y="4187823"/>
+            <a:off x="5958145" y="4015451"/>
             <a:ext cx="1847850" cy="1581150"/>
           </a:xfrm>
           <a:prstGeom prst="rect">
@@ -6829,7 +7148,7 @@
 </p:sld>
 </file>
 
-<file path=ppt/slides/slide6.xml><?xml version="1.0" encoding="utf-8"?>
+<file path=ppt/slides/slide7.xml><?xml version="1.0" encoding="utf-8"?>
 <p:sld xmlns:a="http://schemas.openxmlformats.org/drawingml/2006/main" xmlns:r="http://schemas.openxmlformats.org/officeDocument/2006/relationships" xmlns:p="http://schemas.openxmlformats.org/presentationml/2006/main">
   <p:cSld>
     <p:spTree>
@@ -6936,7 +7255,7 @@
 </p:sld>
 </file>
 
-<file path=ppt/slides/slide7.xml><?xml version="1.0" encoding="utf-8"?>
+<file path=ppt/slides/slide8.xml><?xml version="1.0" encoding="utf-8"?>
 <p:sld xmlns:a="http://schemas.openxmlformats.org/drawingml/2006/main" xmlns:r="http://schemas.openxmlformats.org/officeDocument/2006/relationships" xmlns:p="http://schemas.openxmlformats.org/presentationml/2006/main">
   <p:cSld>
     <p:spTree>
@@ -7046,7 +7365,7 @@
 </p:sld>
 </file>
 
-<file path=ppt/slides/slide8.xml><?xml version="1.0" encoding="utf-8"?>
+<file path=ppt/slides/slide9.xml><?xml version="1.0" encoding="utf-8"?>
 <p:sld xmlns:a="http://schemas.openxmlformats.org/drawingml/2006/main" xmlns:r="http://schemas.openxmlformats.org/officeDocument/2006/relationships" xmlns:p="http://schemas.openxmlformats.org/presentationml/2006/main">
   <p:cSld>
     <p:spTree>

</xml_diff>